<commit_message>
updating allele figure and adding example names
</commit_message>
<xml_diff>
--- a/input/pagecontent/MolDef-IG-Figures-Source.pptx
+++ b/input/pagecontent/MolDef-IG-Figures-Source.pptx
@@ -118,7 +118,7 @@
 <file path=ppt/revisionInfo.xml><?xml version="1.0" encoding="utf-8"?>
 <p1510:revInfo xmlns:a="http://schemas.openxmlformats.org/drawingml/2006/main" xmlns:r="http://schemas.openxmlformats.org/officeDocument/2006/relationships" xmlns:p1510="http://schemas.microsoft.com/office/powerpoint/2015/10/main">
   <p1510:revLst>
-    <p1510:client id="{3C7F73AE-7988-468F-A40C-F52509D850D3}" v="33" dt="2025-10-01T21:04:37.041"/>
+    <p1510:client id="{3C7F73AE-7988-468F-A40C-F52509D850D3}" v="38" dt="2025-10-01T21:09:31.747"/>
   </p1510:revLst>
 </p1510:revInfo>
 </file>
@@ -128,7 +128,7 @@
   <pc:docChgLst>
     <pc:chgData name="Khalifa, Aly M., Ph.D." userId="634bbc94-9ae6-464c-b016-6dfea7a3309a" providerId="ADAL" clId="{3C7F73AE-7988-468F-A40C-F52509D850D3}"/>
     <pc:docChg chg="undo custSel addSld delSld modSld">
-      <pc:chgData name="Khalifa, Aly M., Ph.D." userId="634bbc94-9ae6-464c-b016-6dfea7a3309a" providerId="ADAL" clId="{3C7F73AE-7988-468F-A40C-F52509D850D3}" dt="2025-10-01T21:05:47.855" v="690" actId="1076"/>
+      <pc:chgData name="Khalifa, Aly M., Ph.D." userId="634bbc94-9ae6-464c-b016-6dfea7a3309a" providerId="ADAL" clId="{3C7F73AE-7988-468F-A40C-F52509D850D3}" dt="2025-10-01T21:10:02.659" v="727" actId="1076"/>
       <pc:docMkLst>
         <pc:docMk/>
       </pc:docMkLst>
@@ -147,11 +147,19 @@
         </pc:sldMkLst>
       </pc:sldChg>
       <pc:sldChg chg="addSp delSp modSp new mod">
-        <pc:chgData name="Khalifa, Aly M., Ph.D." userId="634bbc94-9ae6-464c-b016-6dfea7a3309a" providerId="ADAL" clId="{3C7F73AE-7988-468F-A40C-F52509D850D3}" dt="2025-10-01T20:43:07.836" v="344" actId="1582"/>
+        <pc:chgData name="Khalifa, Aly M., Ph.D." userId="634bbc94-9ae6-464c-b016-6dfea7a3309a" providerId="ADAL" clId="{3C7F73AE-7988-468F-A40C-F52509D850D3}" dt="2025-10-01T21:10:02.659" v="727" actId="1076"/>
         <pc:sldMkLst>
           <pc:docMk/>
           <pc:sldMk cId="3265066682" sldId="260"/>
         </pc:sldMkLst>
+        <pc:spChg chg="add mod ord">
+          <ac:chgData name="Khalifa, Aly M., Ph.D." userId="634bbc94-9ae6-464c-b016-6dfea7a3309a" providerId="ADAL" clId="{3C7F73AE-7988-468F-A40C-F52509D850D3}" dt="2025-10-01T21:09:45.922" v="724" actId="167"/>
+          <ac:spMkLst>
+            <pc:docMk/>
+            <pc:sldMk cId="3265066682" sldId="260"/>
+            <ac:spMk id="2" creationId="{1142C344-FCE8-B3AB-29B8-2DE9BCBFFF3A}"/>
+          </ac:spMkLst>
+        </pc:spChg>
         <pc:spChg chg="del">
           <ac:chgData name="Khalifa, Aly M., Ph.D." userId="634bbc94-9ae6-464c-b016-6dfea7a3309a" providerId="ADAL" clId="{3C7F73AE-7988-468F-A40C-F52509D850D3}" dt="2025-10-01T19:56:10.197" v="3" actId="478"/>
           <ac:spMkLst>
@@ -169,15 +177,15 @@
           </ac:spMkLst>
         </pc:spChg>
         <pc:spChg chg="add mod">
-          <ac:chgData name="Khalifa, Aly M., Ph.D." userId="634bbc94-9ae6-464c-b016-6dfea7a3309a" providerId="ADAL" clId="{3C7F73AE-7988-468F-A40C-F52509D850D3}" dt="2025-10-01T20:37:10.503" v="216" actId="1076"/>
+          <ac:chgData name="Khalifa, Aly M., Ph.D." userId="634bbc94-9ae6-464c-b016-6dfea7a3309a" providerId="ADAL" clId="{3C7F73AE-7988-468F-A40C-F52509D850D3}" dt="2025-10-01T21:08:40.162" v="710" actId="20577"/>
           <ac:spMkLst>
             <pc:docMk/>
             <pc:sldMk cId="3265066682" sldId="260"/>
             <ac:spMk id="5" creationId="{5463C91D-E3AF-AAB2-61D2-D61112DD757E}"/>
           </ac:spMkLst>
         </pc:spChg>
-        <pc:spChg chg="add mod">
-          <ac:chgData name="Khalifa, Aly M., Ph.D." userId="634bbc94-9ae6-464c-b016-6dfea7a3309a" providerId="ADAL" clId="{3C7F73AE-7988-468F-A40C-F52509D850D3}" dt="2025-10-01T20:39:48.142" v="294" actId="1076"/>
+        <pc:spChg chg="add del mod">
+          <ac:chgData name="Khalifa, Aly M., Ph.D." userId="634bbc94-9ae6-464c-b016-6dfea7a3309a" providerId="ADAL" clId="{3C7F73AE-7988-468F-A40C-F52509D850D3}" dt="2025-10-01T21:09:34.517" v="721" actId="478"/>
           <ac:spMkLst>
             <pc:docMk/>
             <pc:sldMk cId="3265066682" sldId="260"/>
@@ -193,7 +201,7 @@
           </ac:spMkLst>
         </pc:spChg>
         <pc:spChg chg="add mod">
-          <ac:chgData name="Khalifa, Aly M., Ph.D." userId="634bbc94-9ae6-464c-b016-6dfea7a3309a" providerId="ADAL" clId="{3C7F73AE-7988-468F-A40C-F52509D850D3}" dt="2025-10-01T20:42:02.709" v="333" actId="1038"/>
+          <ac:chgData name="Khalifa, Aly M., Ph.D." userId="634bbc94-9ae6-464c-b016-6dfea7a3309a" providerId="ADAL" clId="{3C7F73AE-7988-468F-A40C-F52509D850D3}" dt="2025-10-01T21:09:56.137" v="726" actId="14100"/>
           <ac:spMkLst>
             <pc:docMk/>
             <pc:sldMk cId="3265066682" sldId="260"/>
@@ -201,7 +209,7 @@
           </ac:spMkLst>
         </pc:spChg>
         <pc:spChg chg="add mod">
-          <ac:chgData name="Khalifa, Aly M., Ph.D." userId="634bbc94-9ae6-464c-b016-6dfea7a3309a" providerId="ADAL" clId="{3C7F73AE-7988-468F-A40C-F52509D850D3}" dt="2025-10-01T20:41:53.501" v="331" actId="1076"/>
+          <ac:chgData name="Khalifa, Aly M., Ph.D." userId="634bbc94-9ae6-464c-b016-6dfea7a3309a" providerId="ADAL" clId="{3C7F73AE-7988-468F-A40C-F52509D850D3}" dt="2025-10-01T21:10:02.659" v="727" actId="1076"/>
           <ac:spMkLst>
             <pc:docMk/>
             <pc:sldMk cId="3265066682" sldId="260"/>
@@ -226,7 +234,7 @@
         </pc:graphicFrameChg>
       </pc:sldChg>
       <pc:sldChg chg="addSp delSp modSp add mod">
-        <pc:chgData name="Khalifa, Aly M., Ph.D." userId="634bbc94-9ae6-464c-b016-6dfea7a3309a" providerId="ADAL" clId="{3C7F73AE-7988-468F-A40C-F52509D850D3}" dt="2025-10-01T21:05:47.855" v="690" actId="1076"/>
+        <pc:chgData name="Khalifa, Aly M., Ph.D." userId="634bbc94-9ae6-464c-b016-6dfea7a3309a" providerId="ADAL" clId="{3C7F73AE-7988-468F-A40C-F52509D850D3}" dt="2025-10-01T21:09:11.600" v="718" actId="20577"/>
         <pc:sldMkLst>
           <pc:docMk/>
           <pc:sldMk cId="877581998" sldId="261"/>
@@ -240,7 +248,7 @@
           </ac:spMkLst>
         </pc:spChg>
         <pc:spChg chg="mod">
-          <ac:chgData name="Khalifa, Aly M., Ph.D." userId="634bbc94-9ae6-464c-b016-6dfea7a3309a" providerId="ADAL" clId="{3C7F73AE-7988-468F-A40C-F52509D850D3}" dt="2025-10-01T21:03:10.128" v="586" actId="1076"/>
+          <ac:chgData name="Khalifa, Aly M., Ph.D." userId="634bbc94-9ae6-464c-b016-6dfea7a3309a" providerId="ADAL" clId="{3C7F73AE-7988-468F-A40C-F52509D850D3}" dt="2025-10-01T21:09:11.600" v="718" actId="20577"/>
           <ac:spMkLst>
             <pc:docMk/>
             <pc:sldMk cId="877581998" sldId="261"/>
@@ -6181,6 +6189,73 @@
           <a:chExt cx="0" cy="0"/>
         </a:xfrm>
       </p:grpSpPr>
+      <p:sp>
+        <p:nvSpPr>
+          <p:cNvPr id="2" name="Rectangle 1">
+            <a:extLst>
+              <a:ext uri="{FF2B5EF4-FFF2-40B4-BE49-F238E27FC236}">
+                <a16:creationId xmlns:a16="http://schemas.microsoft.com/office/drawing/2014/main" id="{1142C344-FCE8-B3AB-29B8-2DE9BCBFFF3A}"/>
+              </a:ext>
+            </a:extLst>
+          </p:cNvPr>
+          <p:cNvSpPr/>
+          <p:nvPr/>
+        </p:nvSpPr>
+        <p:spPr>
+          <a:xfrm>
+            <a:off x="59757" y="2819138"/>
+            <a:ext cx="4126548" cy="411762"/>
+          </a:xfrm>
+          <a:prstGeom prst="rect">
+            <a:avLst/>
+          </a:prstGeom>
+          <a:noFill/>
+          <a:ln w="28575">
+            <a:solidFill>
+              <a:schemeClr val="accent5">
+                <a:lumMod val="40000"/>
+                <a:lumOff val="60000"/>
+              </a:schemeClr>
+            </a:solidFill>
+            <a:prstDash val="sysDash"/>
+          </a:ln>
+        </p:spPr>
+        <p:style>
+          <a:lnRef idx="2">
+            <a:schemeClr val="accent1">
+              <a:shade val="15000"/>
+            </a:schemeClr>
+          </a:lnRef>
+          <a:fillRef idx="1">
+            <a:schemeClr val="accent1"/>
+          </a:fillRef>
+          <a:effectRef idx="0">
+            <a:schemeClr val="accent1"/>
+          </a:effectRef>
+          <a:fontRef idx="minor">
+            <a:schemeClr val="lt1"/>
+          </a:fontRef>
+        </p:style>
+        <p:txBody>
+          <a:bodyPr rtlCol="0" anchor="ctr"/>
+          <a:lstStyle/>
+          <a:p>
+            <a:r>
+              <a:rPr lang="en-US" sz="1200" b="1" dirty="0">
+                <a:solidFill>
+                  <a:schemeClr val="tx1"/>
+                </a:solidFill>
+              </a:rPr>
+              <a:t>Position: 1016</a:t>
+            </a:r>
+            <a:endParaRPr lang="en-US" sz="1200" dirty="0">
+              <a:solidFill>
+                <a:schemeClr val="tx1"/>
+              </a:solidFill>
+            </a:endParaRPr>
+          </a:p>
+        </p:txBody>
+      </p:sp>
       <p:graphicFrame>
         <p:nvGraphicFramePr>
           <p:cNvPr id="4" name="Table 3">
@@ -7044,8 +7119,8 @@
         </p:nvSpPr>
         <p:spPr>
           <a:xfrm>
-            <a:off x="374596" y="5877978"/>
-            <a:ext cx="5239909" cy="923330"/>
+            <a:off x="5633745" y="4889909"/>
+            <a:ext cx="5930862" cy="1200329"/>
           </a:xfrm>
           <a:prstGeom prst="rect">
             <a:avLst/>
@@ -7076,67 +7151,15 @@
               <a:t> Context State “A” and Allele State “G” at Position 1016</a:t>
             </a:r>
           </a:p>
-        </p:txBody>
-      </p:sp>
-      <p:sp>
-        <p:nvSpPr>
-          <p:cNvPr id="6" name="Arrow: Right 5">
-            <a:extLst>
-              <a:ext uri="{FF2B5EF4-FFF2-40B4-BE49-F238E27FC236}">
-                <a16:creationId xmlns:a16="http://schemas.microsoft.com/office/drawing/2014/main" id="{AB807D34-F1F7-2D83-1837-18FA7BE2E5FD}"/>
-              </a:ext>
-            </a:extLst>
-          </p:cNvPr>
-          <p:cNvSpPr/>
-          <p:nvPr/>
-        </p:nvSpPr>
-        <p:spPr>
-          <a:xfrm>
-            <a:off x="299022" y="2756333"/>
-            <a:ext cx="905732" cy="537372"/>
-          </a:xfrm>
-          <a:prstGeom prst="rightArrow">
-            <a:avLst/>
-          </a:prstGeom>
-          <a:solidFill>
-            <a:schemeClr val="bg1">
-              <a:lumMod val="85000"/>
-            </a:schemeClr>
-          </a:solidFill>
-          <a:ln>
-            <a:solidFill>
-              <a:schemeClr val="tx1"/>
-            </a:solidFill>
-          </a:ln>
-        </p:spPr>
-        <p:style>
-          <a:lnRef idx="2">
-            <a:schemeClr val="accent1">
-              <a:shade val="15000"/>
-            </a:schemeClr>
-          </a:lnRef>
-          <a:fillRef idx="1">
-            <a:schemeClr val="accent1"/>
-          </a:fillRef>
-          <a:effectRef idx="0">
-            <a:schemeClr val="accent1"/>
-          </a:effectRef>
-          <a:fontRef idx="minor">
-            <a:schemeClr val="lt1"/>
-          </a:fontRef>
-        </p:style>
-        <p:txBody>
-          <a:bodyPr rtlCol="0" anchor="ctr"/>
-          <a:lstStyle/>
           <a:p>
             <a:pPr algn="ctr"/>
-            <a:r>
-              <a:rPr lang="en-US" b="1" dirty="0">
-                <a:solidFill>
-                  <a:schemeClr val="tx1"/>
-                </a:solidFill>
-              </a:rPr>
-              <a:t>1016</a:t>
+            <a:endParaRPr lang="en-US" b="1" dirty="0"/>
+          </a:p>
+          <a:p>
+            <a:pPr algn="ctr"/>
+            <a:r>
+              <a:rPr lang="en-US" b="1" dirty="0"/>
+              <a:t>Example Name: example-allelesliced-cyp2c19-1016g</a:t>
             </a:r>
           </a:p>
         </p:txBody>
@@ -7234,15 +7257,15 @@
         </p:nvSpPr>
         <p:spPr>
           <a:xfrm>
-            <a:off x="1265426" y="2335837"/>
+            <a:off x="1209088" y="2019480"/>
             <a:ext cx="749722" cy="632713"/>
           </a:xfrm>
           <a:prstGeom prst="borderCallout1">
             <a:avLst>
               <a:gd name="adj1" fmla="val 48886"/>
               <a:gd name="adj2" fmla="val 99759"/>
-              <a:gd name="adj3" fmla="val 105651"/>
-              <a:gd name="adj4" fmla="val 190569"/>
+              <a:gd name="adj3" fmla="val 120720"/>
+              <a:gd name="adj4" fmla="val 198084"/>
             </a:avLst>
           </a:prstGeom>
           <a:solidFill>
@@ -7297,7 +7320,7 @@
         </p:nvSpPr>
         <p:spPr>
           <a:xfrm>
-            <a:off x="4416710" y="2335837"/>
+            <a:off x="4421043" y="2080350"/>
             <a:ext cx="749722" cy="632713"/>
           </a:xfrm>
           <a:prstGeom prst="borderCallout1">
@@ -8128,8 +8151,8 @@
         </p:nvSpPr>
         <p:spPr>
           <a:xfrm>
-            <a:off x="6355032" y="5401277"/>
-            <a:ext cx="5239909" cy="923330"/>
+            <a:off x="6028107" y="4746896"/>
+            <a:ext cx="6043536" cy="1477328"/>
           </a:xfrm>
           <a:prstGeom prst="rect">
             <a:avLst/>
@@ -8158,6 +8181,17 @@
             <a:r>
               <a:rPr lang="en-US" b="1" dirty="0"/>
               <a:t> Context State “T”, Alternative State “C”, and Reference State “A” at Position 87531302</a:t>
+            </a:r>
+          </a:p>
+          <a:p>
+            <a:pPr algn="ctr"/>
+            <a:endParaRPr lang="en-US" b="1" dirty="0"/>
+          </a:p>
+          <a:p>
+            <a:pPr algn="ctr"/>
+            <a:r>
+              <a:rPr lang="en-US" b="1" dirty="0"/>
+              <a:t>Example Name: example-variation-tri-allelic-ABCB1</a:t>
             </a:r>
           </a:p>
         </p:txBody>

</xml_diff>

<commit_message>
updating figures source ppt
</commit_message>
<xml_diff>
--- a/input/pagecontent/MolDef-IG-Figures-Source.pptx
+++ b/input/pagecontent/MolDef-IG-Figures-Source.pptx
@@ -128,7 +128,7 @@
   <pc:docChgLst>
     <pc:chgData name="Khalifa, Aly M., Ph.D." userId="634bbc94-9ae6-464c-b016-6dfea7a3309a" providerId="ADAL" clId="{3C7F73AE-7988-468F-A40C-F52509D850D3}"/>
     <pc:docChg chg="undo custSel addSld delSld modSld">
-      <pc:chgData name="Khalifa, Aly M., Ph.D." userId="634bbc94-9ae6-464c-b016-6dfea7a3309a" providerId="ADAL" clId="{3C7F73AE-7988-468F-A40C-F52509D850D3}" dt="2025-10-03T21:23:58.732" v="730" actId="1076"/>
+      <pc:chgData name="Khalifa, Aly M., Ph.D." userId="634bbc94-9ae6-464c-b016-6dfea7a3309a" providerId="ADAL" clId="{3C7F73AE-7988-468F-A40C-F52509D850D3}" dt="2025-10-06T14:57:20.295" v="731" actId="20577"/>
       <pc:docMkLst>
         <pc:docMk/>
       </pc:docMkLst>
@@ -202,7 +202,7 @@
         </pc:graphicFrameChg>
       </pc:sldChg>
       <pc:sldChg chg="addSp delSp modSp add mod">
-        <pc:chgData name="Khalifa, Aly M., Ph.D." userId="634bbc94-9ae6-464c-b016-6dfea7a3309a" providerId="ADAL" clId="{3C7F73AE-7988-468F-A40C-F52509D850D3}" dt="2025-10-03T21:23:58.732" v="730" actId="1076"/>
+        <pc:chgData name="Khalifa, Aly M., Ph.D." userId="634bbc94-9ae6-464c-b016-6dfea7a3309a" providerId="ADAL" clId="{3C7F73AE-7988-468F-A40C-F52509D850D3}" dt="2025-10-06T14:57:20.295" v="731" actId="20577"/>
         <pc:sldMkLst>
           <pc:docMk/>
           <pc:sldMk cId="877581998" sldId="261"/>
@@ -232,7 +232,7 @@
           </ac:spMkLst>
         </pc:spChg>
         <pc:spChg chg="mod">
-          <ac:chgData name="Khalifa, Aly M., Ph.D." userId="634bbc94-9ae6-464c-b016-6dfea7a3309a" providerId="ADAL" clId="{3C7F73AE-7988-468F-A40C-F52509D850D3}" dt="2025-10-01T21:04:17.943" v="672" actId="1036"/>
+          <ac:chgData name="Khalifa, Aly M., Ph.D." userId="634bbc94-9ae6-464c-b016-6dfea7a3309a" providerId="ADAL" clId="{3C7F73AE-7988-468F-A40C-F52509D850D3}" dt="2025-10-06T14:57:20.295" v="731" actId="20577"/>
           <ac:spMkLst>
             <pc:docMk/>
             <pc:sldMk cId="877581998" sldId="261"/>
@@ -463,7 +463,7 @@
           <a:p>
             <a:fld id="{4C5BA447-C523-4466-858C-DFB480D33D92}" type="datetimeFigureOut">
               <a:rPr lang="en-US" smtClean="0"/>
-              <a:t>10/3/2025</a:t>
+              <a:t>10/6/2025</a:t>
             </a:fld>
             <a:endParaRPr lang="en-US"/>
           </a:p>
@@ -661,7 +661,7 @@
           <a:p>
             <a:fld id="{4C5BA447-C523-4466-858C-DFB480D33D92}" type="datetimeFigureOut">
               <a:rPr lang="en-US" smtClean="0"/>
-              <a:t>10/3/2025</a:t>
+              <a:t>10/6/2025</a:t>
             </a:fld>
             <a:endParaRPr lang="en-US"/>
           </a:p>
@@ -869,7 +869,7 @@
           <a:p>
             <a:fld id="{4C5BA447-C523-4466-858C-DFB480D33D92}" type="datetimeFigureOut">
               <a:rPr lang="en-US" smtClean="0"/>
-              <a:t>10/3/2025</a:t>
+              <a:t>10/6/2025</a:t>
             </a:fld>
             <a:endParaRPr lang="en-US"/>
           </a:p>
@@ -1067,7 +1067,7 @@
           <a:p>
             <a:fld id="{4C5BA447-C523-4466-858C-DFB480D33D92}" type="datetimeFigureOut">
               <a:rPr lang="en-US" smtClean="0"/>
-              <a:t>10/3/2025</a:t>
+              <a:t>10/6/2025</a:t>
             </a:fld>
             <a:endParaRPr lang="en-US"/>
           </a:p>
@@ -1342,7 +1342,7 @@
           <a:p>
             <a:fld id="{4C5BA447-C523-4466-858C-DFB480D33D92}" type="datetimeFigureOut">
               <a:rPr lang="en-US" smtClean="0"/>
-              <a:t>10/3/2025</a:t>
+              <a:t>10/6/2025</a:t>
             </a:fld>
             <a:endParaRPr lang="en-US"/>
           </a:p>
@@ -1607,7 +1607,7 @@
           <a:p>
             <a:fld id="{4C5BA447-C523-4466-858C-DFB480D33D92}" type="datetimeFigureOut">
               <a:rPr lang="en-US" smtClean="0"/>
-              <a:t>10/3/2025</a:t>
+              <a:t>10/6/2025</a:t>
             </a:fld>
             <a:endParaRPr lang="en-US"/>
           </a:p>
@@ -2019,7 +2019,7 @@
           <a:p>
             <a:fld id="{4C5BA447-C523-4466-858C-DFB480D33D92}" type="datetimeFigureOut">
               <a:rPr lang="en-US" smtClean="0"/>
-              <a:t>10/3/2025</a:t>
+              <a:t>10/6/2025</a:t>
             </a:fld>
             <a:endParaRPr lang="en-US"/>
           </a:p>
@@ -2160,7 +2160,7 @@
           <a:p>
             <a:fld id="{4C5BA447-C523-4466-858C-DFB480D33D92}" type="datetimeFigureOut">
               <a:rPr lang="en-US" smtClean="0"/>
-              <a:t>10/3/2025</a:t>
+              <a:t>10/6/2025</a:t>
             </a:fld>
             <a:endParaRPr lang="en-US"/>
           </a:p>
@@ -2273,7 +2273,7 @@
           <a:p>
             <a:fld id="{4C5BA447-C523-4466-858C-DFB480D33D92}" type="datetimeFigureOut">
               <a:rPr lang="en-US" smtClean="0"/>
-              <a:t>10/3/2025</a:t>
+              <a:t>10/6/2025</a:t>
             </a:fld>
             <a:endParaRPr lang="en-US"/>
           </a:p>
@@ -2584,7 +2584,7 @@
           <a:p>
             <a:fld id="{4C5BA447-C523-4466-858C-DFB480D33D92}" type="datetimeFigureOut">
               <a:rPr lang="en-US" smtClean="0"/>
-              <a:t>10/3/2025</a:t>
+              <a:t>10/6/2025</a:t>
             </a:fld>
             <a:endParaRPr lang="en-US"/>
           </a:p>
@@ -2872,7 +2872,7 @@
           <a:p>
             <a:fld id="{4C5BA447-C523-4466-858C-DFB480D33D92}" type="datetimeFigureOut">
               <a:rPr lang="en-US" smtClean="0"/>
-              <a:t>10/3/2025</a:t>
+              <a:t>10/6/2025</a:t>
             </a:fld>
             <a:endParaRPr lang="en-US"/>
           </a:p>
@@ -3113,7 +3113,7 @@
           <a:p>
             <a:fld id="{4C5BA447-C523-4466-858C-DFB480D33D92}" type="datetimeFigureOut">
               <a:rPr lang="en-US" smtClean="0"/>
-              <a:t>10/3/2025</a:t>
+              <a:t>10/6/2025</a:t>
             </a:fld>
             <a:endParaRPr lang="en-US"/>
           </a:p>
@@ -8202,7 +8202,7 @@
           <a:p>
             <a:pPr algn="ctr"/>
             <a:r>
-              <a:rPr lang="en-US" b="1" dirty="0">
+              <a:rPr lang="en-US" b="1">
                 <a:solidFill>
                   <a:schemeClr val="accent5">
                     <a:lumMod val="75000"/>
@@ -8211,19 +8211,13 @@
               </a:rPr>
               <a:t>C</a:t>
             </a:r>
-          </a:p>
-          <a:p>
-            <a:pPr algn="ctr"/>
-            <a:r>
-              <a:rPr lang="en-US" sz="1000" b="1" dirty="0">
-                <a:solidFill>
-                  <a:schemeClr val="accent5">
-                    <a:lumMod val="75000"/>
-                  </a:schemeClr>
-                </a:solidFill>
-              </a:rPr>
-              <a:t>1016</a:t>
-            </a:r>
+            <a:endParaRPr lang="en-US" b="1" dirty="0">
+              <a:solidFill>
+                <a:schemeClr val="accent5">
+                  <a:lumMod val="75000"/>
+                </a:schemeClr>
+              </a:solidFill>
+            </a:endParaRPr>
           </a:p>
         </p:txBody>
       </p:sp>

</xml_diff>